<commit_message>
fix: small fix in presintation
</commit_message>
<xml_diff>
--- a/Comb sort.pptx
+++ b/Comb sort.pptx
@@ -14,8 +14,7 @@
     <p:sldId id="262" r:id="rId8"/>
     <p:sldId id="263" r:id="rId9"/>
     <p:sldId id="264" r:id="rId10"/>
-    <p:sldId id="265" r:id="rId11"/>
-    <p:sldId id="266" r:id="rId12"/>
+    <p:sldId id="266" r:id="rId11"/>
   </p:sldIdLst>
   <p:sldSz cx="12192000" cy="6858000"/>
   <p:notesSz cx="6858000" cy="9144000"/>
@@ -114,6 +113,11 @@
       </a:defRPr>
     </a:lvl9pPr>
   </p:defaultTextStyle>
+  <p:extLst>
+    <p:ext uri="{EFAFB233-063F-42B5-8137-9DF3F51BA10A}">
+      <p15:sldGuideLst xmlns:p15="http://schemas.microsoft.com/office/powerpoint/2012/main"/>
+    </p:ext>
+  </p:extLst>
 </p:presentation>
 </file>
 
@@ -264,7 +268,7 @@
           <a:p>
             <a:fld id="{EA8C6AE7-338F-431E-A7AF-3061CE534250}" type="datetimeFigureOut">
               <a:rPr lang="ru-RU" smtClean="0"/>
-              <a:t>08.06.2025</a:t>
+              <a:t>10.06.2025</a:t>
             </a:fld>
             <a:endParaRPr lang="ru-RU"/>
           </a:p>
@@ -462,7 +466,7 @@
           <a:p>
             <a:fld id="{EA8C6AE7-338F-431E-A7AF-3061CE534250}" type="datetimeFigureOut">
               <a:rPr lang="ru-RU" smtClean="0"/>
-              <a:t>08.06.2025</a:t>
+              <a:t>10.06.2025</a:t>
             </a:fld>
             <a:endParaRPr lang="ru-RU"/>
           </a:p>
@@ -670,7 +674,7 @@
           <a:p>
             <a:fld id="{EA8C6AE7-338F-431E-A7AF-3061CE534250}" type="datetimeFigureOut">
               <a:rPr lang="ru-RU" smtClean="0"/>
-              <a:t>08.06.2025</a:t>
+              <a:t>10.06.2025</a:t>
             </a:fld>
             <a:endParaRPr lang="ru-RU"/>
           </a:p>
@@ -868,7 +872,7 @@
           <a:p>
             <a:fld id="{EA8C6AE7-338F-431E-A7AF-3061CE534250}" type="datetimeFigureOut">
               <a:rPr lang="ru-RU" smtClean="0"/>
-              <a:t>08.06.2025</a:t>
+              <a:t>10.06.2025</a:t>
             </a:fld>
             <a:endParaRPr lang="ru-RU"/>
           </a:p>
@@ -1143,7 +1147,7 @@
           <a:p>
             <a:fld id="{EA8C6AE7-338F-431E-A7AF-3061CE534250}" type="datetimeFigureOut">
               <a:rPr lang="ru-RU" smtClean="0"/>
-              <a:t>08.06.2025</a:t>
+              <a:t>10.06.2025</a:t>
             </a:fld>
             <a:endParaRPr lang="ru-RU"/>
           </a:p>
@@ -1408,7 +1412,7 @@
           <a:p>
             <a:fld id="{EA8C6AE7-338F-431E-A7AF-3061CE534250}" type="datetimeFigureOut">
               <a:rPr lang="ru-RU" smtClean="0"/>
-              <a:t>08.06.2025</a:t>
+              <a:t>10.06.2025</a:t>
             </a:fld>
             <a:endParaRPr lang="ru-RU"/>
           </a:p>
@@ -1820,7 +1824,7 @@
           <a:p>
             <a:fld id="{EA8C6AE7-338F-431E-A7AF-3061CE534250}" type="datetimeFigureOut">
               <a:rPr lang="ru-RU" smtClean="0"/>
-              <a:t>08.06.2025</a:t>
+              <a:t>10.06.2025</a:t>
             </a:fld>
             <a:endParaRPr lang="ru-RU"/>
           </a:p>
@@ -1961,7 +1965,7 @@
           <a:p>
             <a:fld id="{EA8C6AE7-338F-431E-A7AF-3061CE534250}" type="datetimeFigureOut">
               <a:rPr lang="ru-RU" smtClean="0"/>
-              <a:t>08.06.2025</a:t>
+              <a:t>10.06.2025</a:t>
             </a:fld>
             <a:endParaRPr lang="ru-RU"/>
           </a:p>
@@ -2074,7 +2078,7 @@
           <a:p>
             <a:fld id="{EA8C6AE7-338F-431E-A7AF-3061CE534250}" type="datetimeFigureOut">
               <a:rPr lang="ru-RU" smtClean="0"/>
-              <a:t>08.06.2025</a:t>
+              <a:t>10.06.2025</a:t>
             </a:fld>
             <a:endParaRPr lang="ru-RU"/>
           </a:p>
@@ -2385,7 +2389,7 @@
           <a:p>
             <a:fld id="{EA8C6AE7-338F-431E-A7AF-3061CE534250}" type="datetimeFigureOut">
               <a:rPr lang="ru-RU" smtClean="0"/>
-              <a:t>08.06.2025</a:t>
+              <a:t>10.06.2025</a:t>
             </a:fld>
             <a:endParaRPr lang="ru-RU"/>
           </a:p>
@@ -2673,7 +2677,7 @@
           <a:p>
             <a:fld id="{EA8C6AE7-338F-431E-A7AF-3061CE534250}" type="datetimeFigureOut">
               <a:rPr lang="ru-RU" smtClean="0"/>
-              <a:t>08.06.2025</a:t>
+              <a:t>10.06.2025</a:t>
             </a:fld>
             <a:endParaRPr lang="ru-RU"/>
           </a:p>
@@ -2914,7 +2918,7 @@
           <a:p>
             <a:fld id="{EA8C6AE7-338F-431E-A7AF-3061CE534250}" type="datetimeFigureOut">
               <a:rPr lang="ru-RU" smtClean="0"/>
-              <a:t>08.06.2025</a:t>
+              <a:t>10.06.2025</a:t>
             </a:fld>
             <a:endParaRPr lang="ru-RU"/>
           </a:p>
@@ -3399,122 +3403,6 @@
 </file>
 
 <file path=ppt/slides/slide10.xml><?xml version="1.0" encoding="utf-8"?>
-<p:sld xmlns:a="http://schemas.openxmlformats.org/drawingml/2006/main" xmlns:r="http://schemas.openxmlformats.org/officeDocument/2006/relationships" xmlns:p="http://schemas.openxmlformats.org/presentationml/2006/main">
-  <p:cSld>
-    <p:spTree>
-      <p:nvGrpSpPr>
-        <p:cNvPr id="1" name=""/>
-        <p:cNvGrpSpPr/>
-        <p:nvPr/>
-      </p:nvGrpSpPr>
-      <p:grpSpPr>
-        <a:xfrm>
-          <a:off x="0" y="0"/>
-          <a:ext cx="0" cy="0"/>
-          <a:chOff x="0" y="0"/>
-          <a:chExt cx="0" cy="0"/>
-        </a:xfrm>
-      </p:grpSpPr>
-      <p:sp>
-        <p:nvSpPr>
-          <p:cNvPr id="2" name="Заголовок 1">
-            <a:extLst>
-              <a:ext uri="{FF2B5EF4-FFF2-40B4-BE49-F238E27FC236}">
-                <a16:creationId xmlns:a16="http://schemas.microsoft.com/office/drawing/2014/main" id="{9454ED0E-0A4E-A26D-1F5E-17A9EF4DBB7C}"/>
-              </a:ext>
-            </a:extLst>
-          </p:cNvPr>
-          <p:cNvSpPr>
-            <a:spLocks noGrp="1"/>
-          </p:cNvSpPr>
-          <p:nvPr>
-            <p:ph type="ctrTitle"/>
-          </p:nvPr>
-        </p:nvSpPr>
-        <p:spPr/>
-        <p:txBody>
-          <a:bodyPr/>
-          <a:lstStyle/>
-          <a:p>
-            <a:endParaRPr lang="ru-RU" dirty="0"/>
-          </a:p>
-        </p:txBody>
-      </p:sp>
-      <p:sp>
-        <p:nvSpPr>
-          <p:cNvPr id="3" name="Подзаголовок 2">
-            <a:extLst>
-              <a:ext uri="{FF2B5EF4-FFF2-40B4-BE49-F238E27FC236}">
-                <a16:creationId xmlns:a16="http://schemas.microsoft.com/office/drawing/2014/main" id="{81D201D0-7818-2E49-87E0-A96ED80F9602}"/>
-              </a:ext>
-            </a:extLst>
-          </p:cNvPr>
-          <p:cNvSpPr>
-            <a:spLocks noGrp="1"/>
-          </p:cNvSpPr>
-          <p:nvPr>
-            <p:ph type="subTitle" idx="1"/>
-          </p:nvPr>
-        </p:nvSpPr>
-        <p:spPr/>
-        <p:txBody>
-          <a:bodyPr/>
-          <a:lstStyle/>
-          <a:p>
-            <a:endParaRPr lang="ru-RU" dirty="0"/>
-          </a:p>
-        </p:txBody>
-      </p:sp>
-      <p:pic>
-        <p:nvPicPr>
-          <p:cNvPr id="11" name="Рисунок 10" descr="Изображение выглядит как текст, Шрифт, снимок экрана">
-            <a:extLst>
-              <a:ext uri="{FF2B5EF4-FFF2-40B4-BE49-F238E27FC236}">
-                <a16:creationId xmlns:a16="http://schemas.microsoft.com/office/drawing/2014/main" id="{F57A9D9D-038D-66E0-F48C-08052060FB62}"/>
-              </a:ext>
-            </a:extLst>
-          </p:cNvPr>
-          <p:cNvPicPr>
-            <a:picLocks noChangeAspect="1"/>
-          </p:cNvPicPr>
-          <p:nvPr/>
-        </p:nvPicPr>
-        <p:blipFill>
-          <a:blip r:embed="rId2">
-            <a:extLst>
-              <a:ext uri="{28A0092B-C50C-407E-A947-70E740481C1C}">
-                <a14:useLocalDpi xmlns:a14="http://schemas.microsoft.com/office/drawing/2010/main" val="0"/>
-              </a:ext>
-            </a:extLst>
-          </a:blip>
-          <a:stretch>
-            <a:fillRect/>
-          </a:stretch>
-        </p:blipFill>
-        <p:spPr>
-          <a:xfrm>
-            <a:off x="1498041" y="402131"/>
-            <a:ext cx="9195917" cy="6053738"/>
-          </a:xfrm>
-          <a:prstGeom prst="rect">
-            <a:avLst/>
-          </a:prstGeom>
-        </p:spPr>
-      </p:pic>
-    </p:spTree>
-    <p:extLst>
-      <p:ext uri="{BB962C8B-B14F-4D97-AF65-F5344CB8AC3E}">
-        <p14:creationId xmlns:p14="http://schemas.microsoft.com/office/powerpoint/2010/main" val="3598113493"/>
-      </p:ext>
-    </p:extLst>
-  </p:cSld>
-  <p:clrMapOvr>
-    <a:masterClrMapping/>
-  </p:clrMapOvr>
-</p:sld>
-</file>
-
-<file path=ppt/slides/slide11.xml><?xml version="1.0" encoding="utf-8"?>
 <p:sld xmlns:a="http://schemas.openxmlformats.org/drawingml/2006/main" xmlns:r="http://schemas.openxmlformats.org/officeDocument/2006/relationships" xmlns:p="http://schemas.openxmlformats.org/presentationml/2006/main">
   <p:cSld>
     <p:spTree>

</xml_diff>